<commit_message>
added .gitignore and latest revision of the presentation
</commit_message>
<xml_diff>
--- a/GIT_training.pptx
+++ b/GIT_training.pptx
@@ -3262,80 +3262,80 @@
         <p:spPr/>
         <p:txBody>
           <a:bodyPr>
-            <a:normAutofit fontScale="92500" lnSpcReduction="10000"/>
+            <a:normAutofit/>
           </a:bodyPr>
           <a:lstStyle/>
           <a:p>
             <a:r>
-              <a:rPr lang="en-US" dirty="0" err="1" smtClean="0"/>
+              <a:rPr lang="en-US" sz="2600" dirty="0" err="1" smtClean="0"/>
               <a:t>Github</a:t>
             </a:r>
-            <a:r>
-              <a:rPr lang="en-US" dirty="0" smtClean="0"/>
-              <a:t> - </a:t>
-            </a:r>
-            <a:r>
-              <a:rPr lang="en-US" dirty="0" smtClean="0">
+            <a:endParaRPr lang="en-US" sz="2600" dirty="0"/>
+          </a:p>
+          <a:p>
+            <a:pPr lvl="1"/>
+            <a:r>
+              <a:rPr lang="en-US" sz="2600" dirty="0" smtClean="0">
                 <a:hlinkClick r:id="rId2"/>
               </a:rPr>
-              <a:t>http://github-windows.s3.amazonaws.com/GitHubSetup.exe</a:t>
-            </a:r>
-            <a:endParaRPr lang="en-US" dirty="0" smtClean="0"/>
-          </a:p>
-          <a:p>
-            <a:r>
-              <a:rPr lang="en-US" dirty="0" smtClean="0">
+              <a:t>http</a:t>
+            </a:r>
+            <a:r>
+              <a:rPr lang="en-US" sz="2600" dirty="0" smtClean="0">
+                <a:hlinkClick r:id="rId2"/>
+              </a:rPr>
+              <a:t>://github-windows.s3.amazonaws.com/GitHubSetup.exe</a:t>
+            </a:r>
+            <a:endParaRPr lang="en-US" sz="2600" dirty="0" smtClean="0"/>
+          </a:p>
+          <a:p>
+            <a:r>
+              <a:rPr lang="en-US" sz="2600" dirty="0" smtClean="0">
                 <a:hlinkClick r:id="rId3"/>
               </a:rPr>
-              <a:t>http</a:t>
-            </a:r>
-            <a:r>
-              <a:rPr lang="en-US" dirty="0" smtClean="0">
-                <a:hlinkClick r:id="rId3"/>
-              </a:rPr>
-              <a:t>://stash.ds.adp.com/scm/ipns/adminscripts.git</a:t>
-            </a:r>
-            <a:endParaRPr lang="en-US" dirty="0" smtClean="0"/>
+              <a:t>http://stash.ds.adp.com/scm/ipns/adminscripts.git</a:t>
+            </a:r>
+            <a:endParaRPr lang="en-US" sz="2600" dirty="0" smtClean="0"/>
           </a:p>
           <a:p>
             <a:pPr lvl="1"/>
             <a:r>
-              <a:rPr lang="en-US" dirty="0" smtClean="0"/>
+              <a:rPr lang="en-US" sz="2600" dirty="0" smtClean="0"/>
               <a:t>Login using your DS credentials</a:t>
             </a:r>
           </a:p>
           <a:p>
             <a:r>
-              <a:rPr lang="en-US" dirty="0" smtClean="0">
+              <a:rPr lang="en-US" sz="2600" dirty="0" smtClean="0">
                 <a:hlinkClick r:id="rId4"/>
               </a:rPr>
               <a:t>http://stash.ds.adp.com/projects/IPNS/repos/setting-up-git/browse</a:t>
             </a:r>
             <a:r>
-              <a:rPr lang="en-US" dirty="0" smtClean="0"/>
+              <a:rPr lang="en-US" sz="2600" dirty="0" smtClean="0"/>
               <a:t> </a:t>
             </a:r>
           </a:p>
           <a:p>
             <a:r>
-              <a:rPr lang="en-US" dirty="0" smtClean="0">
+              <a:rPr lang="en-US" sz="2600" dirty="0" smtClean="0">
                 <a:hlinkClick r:id="rId5"/>
               </a:rPr>
               <a:t>http://git-scm.com/downloads/win</a:t>
             </a:r>
             <a:r>
-              <a:rPr lang="en-US" dirty="0" smtClean="0"/>
+              <a:rPr lang="en-US" sz="2600" dirty="0" smtClean="0"/>
               <a:t> </a:t>
             </a:r>
           </a:p>
           <a:p>
             <a:r>
-              <a:rPr lang="en-US" dirty="0" smtClean="0">
+              <a:rPr lang="en-US" sz="2600" dirty="0" smtClean="0">
                 <a:hlinkClick r:id="rId6"/>
               </a:rPr>
               <a:t>http://git-scm.com/downloads/mac</a:t>
             </a:r>
-            <a:endParaRPr lang="en-US" dirty="0" smtClean="0"/>
+            <a:endParaRPr lang="en-US" sz="2600" dirty="0" smtClean="0"/>
           </a:p>
           <a:p>
             <a:endParaRPr lang="en-US" dirty="0"/>
@@ -3352,6 +3352,13 @@
   <p:clrMapOvr>
     <a:masterClrMapping/>
   </p:clrMapOvr>
+  <p:timing>
+    <p:tnLst>
+      <p:par>
+        <p:cTn id="1" dur="indefinite" restart="never" nodeType="tmRoot"/>
+      </p:par>
+    </p:tnLst>
+  </p:timing>
 </p:sld>
 </file>
 
@@ -3418,11 +3425,7 @@
             </a:pPr>
             <a:r>
               <a:rPr lang="en-US" dirty="0" smtClean="0"/>
-              <a:t>create </a:t>
-            </a:r>
-            <a:r>
-              <a:rPr lang="en-US" dirty="0" smtClean="0"/>
-              <a:t>a directory in your home directory where you put your local copies of the GIT repos</a:t>
+              <a:t>create a directory in your home directory where you put your local copies of the GIT repos</a:t>
             </a:r>
           </a:p>
           <a:p>
@@ -3432,11 +3435,7 @@
             </a:pPr>
             <a:r>
               <a:rPr lang="en-US" dirty="0" smtClean="0"/>
-              <a:t>cd </a:t>
-            </a:r>
-            <a:r>
-              <a:rPr lang="en-US" dirty="0" smtClean="0"/>
-              <a:t>into your new directory</a:t>
+              <a:t>cd into your new directory</a:t>
             </a:r>
           </a:p>
           <a:p>
@@ -3446,11 +3445,7 @@
             </a:pPr>
             <a:r>
               <a:rPr lang="en-US" dirty="0" smtClean="0"/>
-              <a:t>Clone </a:t>
-            </a:r>
-            <a:r>
-              <a:rPr lang="en-US" dirty="0" smtClean="0"/>
-              <a:t>the repo for setting up your </a:t>
+              <a:t>Clone the repo for setting up your </a:t>
             </a:r>
             <a:r>
               <a:rPr lang="en-US" dirty="0" err="1" smtClean="0"/>
@@ -3458,11 +3453,7 @@
             </a:r>
             <a:r>
               <a:rPr lang="en-US" dirty="0" smtClean="0"/>
-              <a:t> </a:t>
-            </a:r>
-            <a:r>
-              <a:rPr lang="en-US" dirty="0" smtClean="0"/>
-              <a:t>environment</a:t>
+              <a:t> environment</a:t>
             </a:r>
           </a:p>
           <a:p>
@@ -3476,23 +3467,13 @@
             </a:r>
             <a:r>
               <a:rPr lang="en-US" dirty="0" smtClean="0"/>
-              <a:t> </a:t>
-            </a:r>
-            <a:r>
-              <a:rPr lang="en-US" dirty="0" smtClean="0"/>
-              <a:t>clone </a:t>
+              <a:t> clone </a:t>
             </a:r>
             <a:r>
               <a:rPr lang="en-US" dirty="0" smtClean="0">
                 <a:hlinkClick r:id="rId2"/>
               </a:rPr>
-              <a:t>http://</a:t>
-            </a:r>
-            <a:r>
-              <a:rPr lang="en-US" dirty="0" smtClean="0">
-                <a:hlinkClick r:id="rId2"/>
-              </a:rPr>
-              <a:t>stash.ds.adp.com/scm/ipns/setting-up-git.git</a:t>
+              <a:t>http://stash.ds.adp.com/scm/ipns/setting-up-git.git</a:t>
             </a:r>
             <a:endParaRPr lang="en-US" dirty="0"/>
           </a:p>
@@ -3503,11 +3484,7 @@
             </a:pPr>
             <a:r>
               <a:rPr lang="en-US" dirty="0" smtClean="0"/>
-              <a:t>You </a:t>
-            </a:r>
-            <a:r>
-              <a:rPr lang="en-US" dirty="0" smtClean="0"/>
-              <a:t>will be asked to enter your DS </a:t>
+              <a:t>You will be asked to enter your DS </a:t>
             </a:r>
             <a:r>
               <a:rPr lang="en-US" dirty="0" err="1" smtClean="0"/>
@@ -3522,11 +3499,7 @@
             </a:pPr>
             <a:r>
               <a:rPr lang="en-US" dirty="0" smtClean="0"/>
-              <a:t>cd </a:t>
-            </a:r>
-            <a:r>
-              <a:rPr lang="en-US" dirty="0" smtClean="0"/>
-              <a:t>setting-up-</a:t>
+              <a:t>cd setting-up-</a:t>
             </a:r>
             <a:r>
               <a:rPr lang="en-US" dirty="0" err="1" smtClean="0"/>
@@ -3541,11 +3514,7 @@
             </a:pPr>
             <a:r>
               <a:rPr lang="en-US" dirty="0" smtClean="0"/>
-              <a:t>append </a:t>
-            </a:r>
-            <a:r>
-              <a:rPr lang="en-US" dirty="0" smtClean="0"/>
-              <a:t>'</a:t>
+              <a:t>append '</a:t>
             </a:r>
             <a:r>
               <a:rPr lang="en-US" dirty="0" err="1" smtClean="0"/>
@@ -3598,11 +3567,7 @@
             </a:r>
             <a:r>
               <a:rPr lang="en-US" dirty="0" smtClean="0"/>
-              <a:t> </a:t>
-            </a:r>
-            <a:r>
-              <a:rPr lang="en-US" dirty="0" smtClean="0"/>
-              <a:t>git_prompt.sh ~/.git_prompt.sh</a:t>
+              <a:t> git_prompt.sh ~/.git_prompt.sh</a:t>
             </a:r>
           </a:p>
           <a:p>
@@ -3612,11 +3577,7 @@
             </a:pPr>
             <a:r>
               <a:rPr lang="en-US" dirty="0" smtClean="0"/>
-              <a:t>read </a:t>
-            </a:r>
-            <a:r>
-              <a:rPr lang="en-US" dirty="0" smtClean="0"/>
-              <a:t>the changes into your environment</a:t>
+              <a:t>read the changes into your environment</a:t>
             </a:r>
           </a:p>
           <a:p>
@@ -3626,11 +3587,7 @@
             </a:pPr>
             <a:r>
               <a:rPr lang="en-US" dirty="0" smtClean="0"/>
-              <a:t> </a:t>
-            </a:r>
-            <a:r>
-              <a:rPr lang="en-US" dirty="0" smtClean="0"/>
-              <a:t>. ~/.</a:t>
+              <a:t> . ~/.</a:t>
             </a:r>
             <a:r>
               <a:rPr lang="en-US" dirty="0" err="1" smtClean="0"/>
@@ -3645,11 +3602,7 @@
             </a:pPr>
             <a:r>
               <a:rPr lang="en-US" dirty="0" smtClean="0"/>
-              <a:t>If </a:t>
-            </a:r>
-            <a:r>
-              <a:rPr lang="en-US" dirty="0" smtClean="0"/>
-              <a:t>everything worked, the word 'master' should have appended onto your prompt</a:t>
+              <a:t>If everything worked, the word 'master' should have appended onto your prompt</a:t>
             </a:r>
           </a:p>
           <a:p>
@@ -3659,11 +3612,7 @@
             </a:pPr>
             <a:r>
               <a:rPr lang="en-US" dirty="0" smtClean="0"/>
-              <a:t>Set </a:t>
-            </a:r>
-            <a:r>
-              <a:rPr lang="en-US" dirty="0" smtClean="0"/>
-              <a:t>some global </a:t>
+              <a:t>Set some global </a:t>
             </a:r>
             <a:r>
               <a:rPr lang="en-US" dirty="0" err="1" smtClean="0"/>
@@ -3733,11 +3682,7 @@
             </a:pPr>
             <a:r>
               <a:rPr lang="en-US" dirty="0" smtClean="0"/>
-              <a:t>your Linux GIT </a:t>
-            </a:r>
-            <a:r>
-              <a:rPr lang="en-US" dirty="0" smtClean="0"/>
-              <a:t>environment is now setup.</a:t>
+              <a:t>your Linux GIT environment is now setup.</a:t>
             </a:r>
           </a:p>
           <a:p>
@@ -3755,6 +3700,13 @@
   <p:clrMapOvr>
     <a:masterClrMapping/>
   </p:clrMapOvr>
+  <p:timing>
+    <p:tnLst>
+      <p:par>
+        <p:cTn id="1" dur="indefinite" restart="never" nodeType="tmRoot"/>
+      </p:par>
+    </p:tnLst>
+  </p:timing>
 </p:sld>
 </file>
 
@@ -3811,177 +3763,178 @@
         <p:spPr/>
         <p:txBody>
           <a:bodyPr>
-            <a:normAutofit fontScale="47500" lnSpcReduction="20000"/>
+            <a:normAutofit fontScale="70000" lnSpcReduction="20000"/>
           </a:bodyPr>
           <a:lstStyle/>
           <a:p>
-            <a:r>
-              <a:rPr lang="en-US" dirty="0" smtClean="0"/>
-              <a:t>Login to ppsnms01.lab1.adpvoice.com</a:t>
-            </a:r>
-          </a:p>
-          <a:p>
-            <a:r>
-              <a:rPr lang="en-US" dirty="0" smtClean="0"/>
-              <a:t>1) create a directory in your home directory where you put your local copies of the GIT repos</a:t>
-            </a:r>
-          </a:p>
-          <a:p>
-            <a:r>
-              <a:rPr lang="en-US" dirty="0" smtClean="0"/>
-              <a:t>2) cd into your new directory</a:t>
-            </a:r>
-          </a:p>
-          <a:p>
-            <a:r>
-              <a:rPr lang="en-US" dirty="0" smtClean="0"/>
-              <a:t>3) Clone the repo for setting up your </a:t>
-            </a:r>
-            <a:r>
-              <a:rPr lang="en-US" dirty="0" err="1" smtClean="0"/>
-              <a:t>git</a:t>
-            </a:r>
-            <a:r>
-              <a:rPr lang="en-US" dirty="0" smtClean="0"/>
-              <a:t> environment</a:t>
-            </a:r>
-          </a:p>
-          <a:p>
-            <a:r>
-              <a:rPr lang="en-US" dirty="0" smtClean="0"/>
-              <a:t>    a) </a:t>
-            </a:r>
-            <a:r>
-              <a:rPr lang="en-US" dirty="0" err="1" smtClean="0"/>
-              <a:t>git</a:t>
-            </a:r>
-            <a:r>
-              <a:rPr lang="en-US" dirty="0" smtClean="0"/>
-              <a:t> clone </a:t>
+            <a:pPr marL="514350" indent="-514350">
+              <a:buFont typeface="+mj-lt"/>
+              <a:buAutoNum type="arabicPeriod"/>
+            </a:pPr>
+            <a:r>
+              <a:rPr lang="en-US" dirty="0" smtClean="0"/>
+              <a:t>Download GitHub and install it</a:t>
+            </a:r>
+          </a:p>
+          <a:p>
+            <a:pPr marL="971550" lvl="1" indent="-514350">
+              <a:buFont typeface="+mj-lt"/>
+              <a:buAutoNum type="arabicPeriod"/>
+            </a:pPr>
+            <a:r>
+              <a:rPr lang="en-US" dirty="0">
+                <a:hlinkClick r:id="rId2"/>
+              </a:rPr>
+              <a:t>http://</a:t>
             </a:r>
             <a:r>
               <a:rPr lang="en-US" dirty="0" smtClean="0">
                 <a:hlinkClick r:id="rId2"/>
               </a:rPr>
-              <a:t>http://stash.ds.adp.com/scm/ipns/setting-up-git.git</a:t>
-            </a:r>
-            <a:endParaRPr lang="en-US" dirty="0" smtClean="0"/>
-          </a:p>
-          <a:p>
-            <a:pPr lvl="1"/>
-            <a:r>
-              <a:rPr lang="en-US" dirty="0" smtClean="0"/>
-              <a:t>You will be asked to enter your DS username and password</a:t>
-            </a:r>
-          </a:p>
-          <a:p>
-            <a:r>
-              <a:rPr lang="en-US" dirty="0" smtClean="0"/>
-              <a:t>4) cd setting-up-</a:t>
+              <a:t>github-windows.s3.amazonaws.com/GitHubSetup.exe</a:t>
+            </a:r>
+            <a:endParaRPr lang="en-US" dirty="0"/>
+          </a:p>
+          <a:p>
+            <a:pPr marL="514350" indent="-514350">
+              <a:buFont typeface="+mj-lt"/>
+              <a:buAutoNum type="arabicPeriod"/>
+            </a:pPr>
+            <a:r>
+              <a:rPr lang="en-US" dirty="0" smtClean="0"/>
+              <a:t>Accept all defaults</a:t>
+            </a:r>
+          </a:p>
+          <a:p>
+            <a:pPr marL="514350" indent="-514350">
+              <a:buFont typeface="+mj-lt"/>
+              <a:buAutoNum type="arabicPeriod"/>
+            </a:pPr>
+            <a:r>
+              <a:rPr lang="en-US" dirty="0" smtClean="0"/>
+              <a:t>If it opens a GitHub window ignore it for now</a:t>
+            </a:r>
+          </a:p>
+          <a:p>
+            <a:pPr marL="514350" indent="-514350">
+              <a:buFont typeface="+mj-lt"/>
+              <a:buAutoNum type="arabicPeriod"/>
+            </a:pPr>
+            <a:r>
+              <a:rPr lang="en-US" dirty="0" smtClean="0"/>
+              <a:t>It should drop a ‘</a:t>
+            </a:r>
+            <a:r>
+              <a:rPr lang="en-US" dirty="0" err="1" smtClean="0"/>
+              <a:t>Git</a:t>
+            </a:r>
+            <a:r>
+              <a:rPr lang="en-US" dirty="0" smtClean="0"/>
+              <a:t> Shell’ shortcut on your desktop</a:t>
+            </a:r>
+          </a:p>
+          <a:p>
+            <a:pPr marL="971550" lvl="1" indent="-514350">
+              <a:buFont typeface="+mj-lt"/>
+              <a:buAutoNum type="arabicPeriod"/>
+            </a:pPr>
+            <a:r>
+              <a:rPr lang="en-US" dirty="0" smtClean="0"/>
+              <a:t>Double click on it to open a </a:t>
+            </a:r>
+            <a:r>
+              <a:rPr lang="en-US" dirty="0" err="1" smtClean="0"/>
+              <a:t>powershell</a:t>
+            </a:r>
+            <a:r>
+              <a:rPr lang="en-US" dirty="0" smtClean="0"/>
+              <a:t> window</a:t>
+            </a:r>
+          </a:p>
+          <a:p>
+            <a:pPr marL="514350" indent="-514350">
+              <a:buFont typeface="+mj-lt"/>
+              <a:buAutoNum type="arabicPeriod"/>
+            </a:pPr>
+            <a:r>
+              <a:rPr lang="en-US" dirty="0" smtClean="0"/>
+              <a:t>Clone </a:t>
+            </a:r>
+            <a:r>
+              <a:rPr lang="en-US" dirty="0" smtClean="0"/>
+              <a:t>the repo for setting up your </a:t>
             </a:r>
             <a:r>
               <a:rPr lang="en-US" dirty="0" err="1" smtClean="0"/>
               <a:t>git</a:t>
             </a:r>
-            <a:endParaRPr lang="en-US" dirty="0" smtClean="0"/>
-          </a:p>
-          <a:p>
-            <a:r>
-              <a:rPr lang="en-US" dirty="0" smtClean="0"/>
-              <a:t>5) append '</a:t>
-            </a:r>
-            <a:r>
-              <a:rPr lang="en-US" dirty="0" err="1" smtClean="0"/>
-              <a:t>bashrc_additions</a:t>
-            </a:r>
-            <a:r>
-              <a:rPr lang="en-US" dirty="0" smtClean="0"/>
-              <a:t>' to your .</a:t>
-            </a:r>
-            <a:r>
-              <a:rPr lang="en-US" dirty="0" err="1" smtClean="0"/>
-              <a:t>bashrc</a:t>
-            </a:r>
-            <a:r>
-              <a:rPr lang="en-US" dirty="0" smtClean="0"/>
-              <a:t> file</a:t>
-            </a:r>
-          </a:p>
-          <a:p>
-            <a:r>
-              <a:rPr lang="en-US" dirty="0" smtClean="0"/>
-              <a:t>    a) cat </a:t>
-            </a:r>
-            <a:r>
-              <a:rPr lang="en-US" dirty="0" err="1" smtClean="0"/>
-              <a:t>bashrc_additions</a:t>
-            </a:r>
-            <a:r>
-              <a:rPr lang="en-US" dirty="0" smtClean="0"/>
-              <a:t> &gt;&gt; ~/.</a:t>
-            </a:r>
-            <a:r>
-              <a:rPr lang="en-US" dirty="0" err="1" smtClean="0"/>
-              <a:t>bashrc</a:t>
-            </a:r>
-            <a:endParaRPr lang="en-US" dirty="0" smtClean="0"/>
-          </a:p>
-          <a:p>
-            <a:r>
-              <a:rPr lang="en-US" dirty="0" smtClean="0"/>
-              <a:t>6) </a:t>
-            </a:r>
-            <a:r>
-              <a:rPr lang="en-US" dirty="0" err="1" smtClean="0"/>
-              <a:t>cp</a:t>
-            </a:r>
-            <a:r>
-              <a:rPr lang="en-US" dirty="0" smtClean="0"/>
-              <a:t> git_prompt.sh ~/.git_prompt.sh</a:t>
-            </a:r>
-          </a:p>
-          <a:p>
-            <a:r>
-              <a:rPr lang="en-US" dirty="0" smtClean="0"/>
-              <a:t>7) read the changes into your environment</a:t>
-            </a:r>
-          </a:p>
-          <a:p>
-            <a:r>
-              <a:rPr lang="en-US" dirty="0" smtClean="0"/>
-              <a:t>    a) . ~/.</a:t>
-            </a:r>
-            <a:r>
-              <a:rPr lang="en-US" dirty="0" err="1" smtClean="0"/>
-              <a:t>bashrc</a:t>
-            </a:r>
-            <a:endParaRPr lang="en-US" dirty="0" smtClean="0"/>
-          </a:p>
-          <a:p>
-            <a:r>
-              <a:rPr lang="en-US" dirty="0" smtClean="0"/>
-              <a:t>8) If everything worked, the word 'master' should have appended onto your prompt</a:t>
-            </a:r>
-          </a:p>
-          <a:p>
-            <a:r>
-              <a:rPr lang="en-US" dirty="0" smtClean="0"/>
-              <a:t>9) Set some global </a:t>
-            </a:r>
+            <a:r>
+              <a:rPr lang="en-US" dirty="0" smtClean="0"/>
+              <a:t> environment</a:t>
+            </a:r>
+          </a:p>
+          <a:p>
+            <a:pPr marL="971550" lvl="1" indent="-514350">
+              <a:buFont typeface="+mj-lt"/>
+              <a:buAutoNum type="arabicPeriod"/>
+            </a:pPr>
             <a:r>
               <a:rPr lang="en-US" dirty="0" err="1" smtClean="0"/>
               <a:t>git</a:t>
             </a:r>
             <a:r>
               <a:rPr lang="en-US" dirty="0" smtClean="0"/>
+              <a:t> </a:t>
+            </a:r>
+            <a:r>
+              <a:rPr lang="en-US" dirty="0" smtClean="0"/>
+              <a:t>clone </a:t>
+            </a:r>
+            <a:r>
+              <a:rPr lang="en-US" dirty="0" smtClean="0">
+                <a:hlinkClick r:id="rId3"/>
+              </a:rPr>
+              <a:t>http://stash.ds.adp.com/scm/ipns/setting-up-git.git</a:t>
+            </a:r>
+            <a:endParaRPr lang="en-US" dirty="0" smtClean="0"/>
+          </a:p>
+          <a:p>
+            <a:pPr marL="971550" lvl="1" indent="-514350">
+              <a:buFont typeface="+mj-lt"/>
+              <a:buAutoNum type="arabicPeriod"/>
+            </a:pPr>
+            <a:r>
+              <a:rPr lang="en-US" dirty="0" smtClean="0"/>
+              <a:t>You will be asked to enter your DS username and password</a:t>
+            </a:r>
+          </a:p>
+          <a:p>
+            <a:pPr marL="514350" indent="-514350">
+              <a:buFont typeface="+mj-lt"/>
+              <a:buAutoNum type="arabicPeriod"/>
+            </a:pPr>
+            <a:r>
+              <a:rPr lang="en-US" dirty="0" smtClean="0"/>
+              <a:t>Set </a:t>
+            </a:r>
+            <a:r>
+              <a:rPr lang="en-US" dirty="0"/>
+              <a:t>some global </a:t>
+            </a:r>
+            <a:r>
+              <a:rPr lang="en-US" dirty="0" err="1"/>
+              <a:t>git</a:t>
+            </a:r>
+            <a:r>
+              <a:rPr lang="en-US" dirty="0"/>
               <a:t> variables</a:t>
             </a:r>
           </a:p>
           <a:p>
-            <a:r>
-              <a:rPr lang="en-US" dirty="0" smtClean="0"/>
-              <a:t>    a) </a:t>
-            </a:r>
+            <a:pPr marL="971550" lvl="1" indent="-514350">
+              <a:buFont typeface="+mj-lt"/>
+              <a:buAutoNum type="arabicPeriod"/>
+            </a:pPr>
             <a:r>
               <a:rPr lang="en-US" dirty="0" err="1" smtClean="0"/>
               <a:t>git</a:t>
@@ -3991,19 +3944,19 @@
               <a:t> </a:t>
             </a:r>
             <a:r>
-              <a:rPr lang="en-US" dirty="0" err="1" smtClean="0"/>
+              <a:rPr lang="en-US" dirty="0" err="1"/>
               <a:t>config</a:t>
             </a:r>
             <a:r>
-              <a:rPr lang="en-US" dirty="0" smtClean="0"/>
+              <a:rPr lang="en-US" dirty="0"/>
               <a:t> --global user.name "Insert your name here"</a:t>
             </a:r>
           </a:p>
           <a:p>
-            <a:r>
-              <a:rPr lang="en-US" dirty="0" smtClean="0"/>
-              <a:t>    b) </a:t>
-            </a:r>
+            <a:pPr marL="971550" lvl="1" indent="-514350">
+              <a:buFont typeface="+mj-lt"/>
+              <a:buAutoNum type="arabicPeriod"/>
+            </a:pPr>
             <a:r>
               <a:rPr lang="en-US" dirty="0" err="1" smtClean="0"/>
               <a:t>git</a:t>
@@ -4013,32 +3966,46 @@
               <a:t> </a:t>
             </a:r>
             <a:r>
-              <a:rPr lang="en-US" dirty="0" err="1" smtClean="0"/>
+              <a:rPr lang="en-US" dirty="0" err="1"/>
               <a:t>config</a:t>
             </a:r>
             <a:r>
-              <a:rPr lang="en-US" dirty="0" smtClean="0"/>
+              <a:rPr lang="en-US" dirty="0"/>
               <a:t> --global </a:t>
             </a:r>
             <a:r>
-              <a:rPr lang="en-US" dirty="0" err="1" smtClean="0"/>
+              <a:rPr lang="en-US" dirty="0" err="1"/>
               <a:t>user.email</a:t>
             </a:r>
             <a:r>
-              <a:rPr lang="en-US" dirty="0" smtClean="0"/>
-              <a:t> "Insert your email address here"</a:t>
-            </a:r>
-          </a:p>
-          <a:p>
+              <a:rPr lang="en-US" dirty="0"/>
+              <a:t> "Insert your email address </a:t>
+            </a:r>
+            <a:r>
+              <a:rPr lang="en-US" smtClean="0"/>
+              <a:t>here“</a:t>
+            </a:r>
             <a:endParaRPr lang="en-US" dirty="0" smtClean="0"/>
           </a:p>
           <a:p>
-            <a:r>
-              <a:rPr lang="en-US" dirty="0" smtClean="0"/>
-              <a:t>10) your GIT environment is now setup.</a:t>
-            </a:r>
-          </a:p>
-          <a:p>
+            <a:pPr marL="514350" indent="-514350">
+              <a:buFont typeface="+mj-lt"/>
+              <a:buAutoNum type="arabicPeriod"/>
+            </a:pPr>
+            <a:r>
+              <a:rPr lang="en-US" dirty="0" smtClean="0"/>
+              <a:t>your </a:t>
+            </a:r>
+            <a:r>
+              <a:rPr lang="en-US" dirty="0" smtClean="0"/>
+              <a:t>GIT environment is now setup.</a:t>
+            </a:r>
+          </a:p>
+          <a:p>
+            <a:pPr marL="514350" indent="-514350">
+              <a:buFont typeface="+mj-lt"/>
+              <a:buAutoNum type="arabicPeriod"/>
+            </a:pPr>
             <a:endParaRPr lang="en-US" dirty="0"/>
           </a:p>
         </p:txBody>

</xml_diff>